<commit_message>
getting up to date
</commit_message>
<xml_diff>
--- a/greg/docs/week_3_third quarter.pptx
+++ b/greg/docs/week_3_third quarter.pptx
@@ -293,7 +293,7 @@
           <a:p>
             <a:fld id="{49B452E0-6895-4582-877A-7C9C26466FAE}" type="datetimeFigureOut">
               <a:rPr lang="en-US" smtClean="0"/>
-              <a:t>4/18/2018</a:t>
+              <a:t>4/21/2018</a:t>
             </a:fld>
             <a:endParaRPr lang="en-US"/>
           </a:p>
@@ -463,7 +463,7 @@
           <a:p>
             <a:fld id="{49B452E0-6895-4582-877A-7C9C26466FAE}" type="datetimeFigureOut">
               <a:rPr lang="en-US" smtClean="0"/>
-              <a:t>4/18/2018</a:t>
+              <a:t>4/21/2018</a:t>
             </a:fld>
             <a:endParaRPr lang="en-US"/>
           </a:p>
@@ -643,7 +643,7 @@
           <a:p>
             <a:fld id="{49B452E0-6895-4582-877A-7C9C26466FAE}" type="datetimeFigureOut">
               <a:rPr lang="en-US" smtClean="0"/>
-              <a:t>4/18/2018</a:t>
+              <a:t>4/21/2018</a:t>
             </a:fld>
             <a:endParaRPr lang="en-US"/>
           </a:p>
@@ -813,7 +813,7 @@
           <a:p>
             <a:fld id="{49B452E0-6895-4582-877A-7C9C26466FAE}" type="datetimeFigureOut">
               <a:rPr lang="en-US" smtClean="0"/>
-              <a:t>4/18/2018</a:t>
+              <a:t>4/21/2018</a:t>
             </a:fld>
             <a:endParaRPr lang="en-US"/>
           </a:p>
@@ -1059,7 +1059,7 @@
           <a:p>
             <a:fld id="{49B452E0-6895-4582-877A-7C9C26466FAE}" type="datetimeFigureOut">
               <a:rPr lang="en-US" smtClean="0"/>
-              <a:t>4/18/2018</a:t>
+              <a:t>4/21/2018</a:t>
             </a:fld>
             <a:endParaRPr lang="en-US"/>
           </a:p>
@@ -1347,7 +1347,7 @@
           <a:p>
             <a:fld id="{49B452E0-6895-4582-877A-7C9C26466FAE}" type="datetimeFigureOut">
               <a:rPr lang="en-US" smtClean="0"/>
-              <a:t>4/18/2018</a:t>
+              <a:t>4/21/2018</a:t>
             </a:fld>
             <a:endParaRPr lang="en-US"/>
           </a:p>
@@ -1769,7 +1769,7 @@
           <a:p>
             <a:fld id="{49B452E0-6895-4582-877A-7C9C26466FAE}" type="datetimeFigureOut">
               <a:rPr lang="en-US" smtClean="0"/>
-              <a:t>4/18/2018</a:t>
+              <a:t>4/21/2018</a:t>
             </a:fld>
             <a:endParaRPr lang="en-US"/>
           </a:p>
@@ -1887,7 +1887,7 @@
           <a:p>
             <a:fld id="{49B452E0-6895-4582-877A-7C9C26466FAE}" type="datetimeFigureOut">
               <a:rPr lang="en-US" smtClean="0"/>
-              <a:t>4/18/2018</a:t>
+              <a:t>4/21/2018</a:t>
             </a:fld>
             <a:endParaRPr lang="en-US"/>
           </a:p>
@@ -1982,7 +1982,7 @@
           <a:p>
             <a:fld id="{49B452E0-6895-4582-877A-7C9C26466FAE}" type="datetimeFigureOut">
               <a:rPr lang="en-US" smtClean="0"/>
-              <a:t>4/18/2018</a:t>
+              <a:t>4/21/2018</a:t>
             </a:fld>
             <a:endParaRPr lang="en-US"/>
           </a:p>
@@ -2259,7 +2259,7 @@
           <a:p>
             <a:fld id="{49B452E0-6895-4582-877A-7C9C26466FAE}" type="datetimeFigureOut">
               <a:rPr lang="en-US" smtClean="0"/>
-              <a:t>4/18/2018</a:t>
+              <a:t>4/21/2018</a:t>
             </a:fld>
             <a:endParaRPr lang="en-US"/>
           </a:p>
@@ -2512,7 +2512,7 @@
           <a:p>
             <a:fld id="{49B452E0-6895-4582-877A-7C9C26466FAE}" type="datetimeFigureOut">
               <a:rPr lang="en-US" smtClean="0"/>
-              <a:t>4/18/2018</a:t>
+              <a:t>4/21/2018</a:t>
             </a:fld>
             <a:endParaRPr lang="en-US"/>
           </a:p>
@@ -2725,7 +2725,7 @@
           <a:p>
             <a:fld id="{49B452E0-6895-4582-877A-7C9C26466FAE}" type="datetimeFigureOut">
               <a:rPr lang="en-US" smtClean="0"/>
-              <a:t>4/18/2018</a:t>
+              <a:t>4/21/2018</a:t>
             </a:fld>
             <a:endParaRPr lang="en-US"/>
           </a:p>
@@ -4659,11 +4659,7 @@
             </a:pPr>
             <a:r>
               <a:rPr lang="en-US" sz="2400" dirty="0" smtClean="0"/>
-              <a:t>Watch </a:t>
-            </a:r>
-            <a:r>
-              <a:rPr lang="en-US" sz="2400" dirty="0" smtClean="0"/>
-              <a:t>out for:</a:t>
+              <a:t>Watch out for:</a:t>
             </a:r>
           </a:p>
           <a:p>
@@ -4673,11 +4669,7 @@
             </a:r>
             <a:r>
               <a:rPr lang="en-US" sz="2400" dirty="0" err="1" smtClean="0"/>
-              <a:t>id_mon</a:t>
-            </a:r>
-            <a:r>
-              <a:rPr lang="en-US" sz="2400" dirty="0" err="1" smtClean="0"/>
-              <a:t>_yr</a:t>
+              <a:t>id_mon_yr</a:t>
             </a:r>
             <a:endParaRPr lang="en-US" sz="2000" dirty="0" smtClean="0"/>
           </a:p>
@@ -4817,13 +4809,8 @@
             </a:r>
             <a:r>
               <a:rPr lang="en-US" sz="1600" dirty="0" smtClean="0"/>
-              <a:t>productivity</a:t>
-            </a:r>
-            <a:r>
-              <a:rPr lang="en-US" sz="1600" dirty="0" smtClean="0"/>
-              <a:t>: Benoit</a:t>
-            </a:r>
-            <a:endParaRPr lang="en-US" sz="1600" dirty="0" smtClean="0"/>
+              <a:t>productivity: Benoit</a:t>
+            </a:r>
           </a:p>
           <a:p>
             <a:pPr marL="0" lvl="1" indent="0">
@@ -4845,11 +4832,7 @@
             </a:r>
             <a:r>
               <a:rPr lang="en-US" sz="1600" dirty="0" smtClean="0"/>
-              <a:t>temperature</a:t>
-            </a:r>
-            <a:r>
-              <a:rPr lang="en-US" sz="1600" dirty="0" smtClean="0"/>
-              <a:t>: </a:t>
+              <a:t>temperature: </a:t>
             </a:r>
             <a:r>
               <a:rPr lang="en-US" sz="1600" dirty="0" err="1" smtClean="0"/>
@@ -4877,11 +4860,7 @@
             </a:r>
             <a:r>
               <a:rPr lang="en-US" sz="1600" dirty="0" smtClean="0"/>
-              <a:t>concentration</a:t>
-            </a:r>
-            <a:r>
-              <a:rPr lang="en-US" sz="1600" dirty="0" smtClean="0"/>
-              <a:t>: </a:t>
+              <a:t>concentration: </a:t>
             </a:r>
             <a:r>
               <a:rPr lang="en-US" sz="1600" dirty="0" err="1" smtClean="0"/>
@@ -4891,7 +4870,6 @@
               <a:rPr lang="en-US" sz="1600" dirty="0" smtClean="0"/>
               <a:t>, Mariam</a:t>
             </a:r>
-            <a:endParaRPr lang="en-US" sz="1600" dirty="0" smtClean="0"/>
           </a:p>
           <a:p>
             <a:pPr marL="0" lvl="1" indent="0">
@@ -4905,13 +4883,8 @@
             </a:pPr>
             <a:r>
               <a:rPr lang="en-US" sz="1600" dirty="0" smtClean="0"/>
-              <a:t>Mineral ballast</a:t>
-            </a:r>
-            <a:r>
-              <a:rPr lang="en-US" sz="1600" dirty="0" smtClean="0"/>
-              <a:t>: Louis &amp; Francois</a:t>
-            </a:r>
-            <a:endParaRPr lang="en-US" sz="1600" dirty="0" smtClean="0"/>
+              <a:t>Mineral ballast: Louis &amp; Francois</a:t>
+            </a:r>
           </a:p>
           <a:p>
             <a:pPr marL="0" lvl="1" indent="0">
@@ -4933,11 +4906,15 @@
             </a:r>
             <a:r>
               <a:rPr lang="en-US" sz="1600" dirty="0" smtClean="0"/>
-              <a:t>size: </a:t>
-            </a:r>
-            <a:r>
-              <a:rPr lang="en-US" sz="1600" dirty="0" smtClean="0"/>
-              <a:t>Cathy</a:t>
+              <a:t>size</a:t>
+            </a:r>
+            <a:r>
+              <a:rPr lang="en-US" sz="1600" smtClean="0"/>
+              <a:t>: </a:t>
+            </a:r>
+            <a:r>
+              <a:rPr lang="en-US" sz="1600" smtClean="0"/>
+              <a:t>Cathy?</a:t>
             </a:r>
             <a:endParaRPr lang="en-US" sz="1600" dirty="0" smtClean="0"/>
           </a:p>
@@ -4968,11 +4945,7 @@
             </a:pPr>
             <a:r>
               <a:rPr lang="en-US" sz="1600" dirty="0" smtClean="0"/>
-              <a:t>Subsurface oxygen: </a:t>
-            </a:r>
-            <a:r>
-              <a:rPr lang="en-US" sz="1600" dirty="0" smtClean="0"/>
-              <a:t>Greg</a:t>
+              <a:t>Subsurface oxygen: Greg</a:t>
             </a:r>
           </a:p>
           <a:p>

</xml_diff>